<commit_message>
Presentation update for build commands and gradle conf files description
</commit_message>
<xml_diff>
--- a/WDSR - ćwiczenie 1.pptx
+++ b/WDSR - ćwiczenie 1.pptx
@@ -158,7 +158,7 @@
   </p:defaultTextStyle>
   <p:extLst>
     <p:ext uri="{EFAFB233-063F-42B5-8137-9DF3F51BA10A}">
-      <p15:sldGuideLst xmlns:p15="http://schemas.microsoft.com/office/powerpoint/2012/main" xmlns="">
+      <p15:sldGuideLst xmlns:p15="http://schemas.microsoft.com/office/powerpoint/2012/main">
         <p15:guide id="1" orient="horz" pos="1620">
           <p15:clr>
             <a:srgbClr val="A4A3A4"/>
@@ -192,7 +192,7 @@
       </p15:sldGuideLst>
     </p:ext>
     <p:ext uri="{2D200454-40CA-4A62-9FC3-DE9A4176ACB9}">
-      <p15:notesGuideLst xmlns:p15="http://schemas.microsoft.com/office/powerpoint/2012/main" xmlns=""/>
+      <p15:notesGuideLst xmlns:p15="http://schemas.microsoft.com/office/powerpoint/2012/main"/>
     </p:ext>
   </p:extLst>
 </p:presentation>
@@ -287,7 +287,7 @@
             <a:fld id="{C4843D26-F355-3844-A4EF-19D4FD875597}" type="datetimeFigureOut">
               <a:rPr lang="de-DE" smtClean="0"/>
               <a:pPr/>
-              <a:t>22.02.2016</a:t>
+              <a:t>01.03.2017</a:t>
             </a:fld>
             <a:endParaRPr lang="de-DE" dirty="0"/>
           </a:p>
@@ -455,7 +455,7 @@
             <a:fld id="{8E2CFE12-C1FB-D740-8B6C-AFB72D5D4002}" type="datetimeFigureOut">
               <a:rPr lang="de-DE" smtClean="0"/>
               <a:pPr/>
-              <a:t>22.02.2016</a:t>
+              <a:t>01.03.2017</a:t>
             </a:fld>
             <a:endParaRPr lang="de-DE" dirty="0"/>
           </a:p>
@@ -5405,7 +5405,7 @@
   </p:timing>
   <p:extLst mod="1">
     <p:ext uri="{DCECCB84-F9BA-43D5-87BE-67443E8EF086}">
-      <p15:sldGuideLst xmlns:p15="http://schemas.microsoft.com/office/powerpoint/2012/main" xmlns="">
+      <p15:sldGuideLst xmlns:p15="http://schemas.microsoft.com/office/powerpoint/2012/main">
         <p15:guide id="1" orient="horz" pos="1221">
           <p15:clr>
             <a:srgbClr val="C35EA4"/>
@@ -5738,7 +5738,7 @@
   </p:clrMapOvr>
   <p:extLst mod="1">
     <p:ext uri="{DCECCB84-F9BA-43D5-87BE-67443E8EF086}">
-      <p15:sldGuideLst xmlns:p15="http://schemas.microsoft.com/office/powerpoint/2012/main" xmlns="">
+      <p15:sldGuideLst xmlns:p15="http://schemas.microsoft.com/office/powerpoint/2012/main">
         <p15:guide id="1" orient="horz" pos="1221">
           <p15:clr>
             <a:srgbClr val="C35EA4"/>
@@ -6477,7 +6477,7 @@
           <a:graphicData uri="http://schemas.openxmlformats.org/presentationml/2006/ole">
             <mc:AlternateContent xmlns:mc="http://schemas.openxmlformats.org/markup-compatibility/2006">
               <mc:Choice xmlns:v="urn:schemas-microsoft-com:vml" Requires="v">
-                <p:oleObj spid="_x0000_s2199" name="think-cell Folie" r:id="rId4" imgW="305" imgH="303" progId="TCLayout.ActiveDocument.1">
+                <p:oleObj spid="_x0000_s2213" name="think-cell Folie" r:id="rId4" imgW="305" imgH="303" progId="TCLayout.ActiveDocument.1">
                   <p:embed/>
                 </p:oleObj>
               </mc:Choice>
@@ -6874,7 +6874,7 @@
           <a:graphicData uri="http://schemas.openxmlformats.org/presentationml/2006/ole">
             <mc:AlternateContent xmlns:mc="http://schemas.openxmlformats.org/markup-compatibility/2006">
               <mc:Choice xmlns:v="urn:schemas-microsoft-com:vml" Requires="v">
-                <p:oleObj spid="_x0000_s1180" name="think-cell Folie" r:id="rId13" imgW="305" imgH="303" progId="TCLayout.ActiveDocument.1">
+                <p:oleObj spid="_x0000_s1194" name="think-cell Folie" r:id="rId13" imgW="305" imgH="303" progId="TCLayout.ActiveDocument.1">
                   <p:embed/>
                 </p:oleObj>
               </mc:Choice>
@@ -8082,7 +8082,7 @@
   </p:txStyles>
   <p:extLst mod="1">
     <p:ext uri="{27BBF7A9-308A-43DC-89C8-2F10F3537804}">
-      <p15:sldGuideLst xmlns:p15="http://schemas.microsoft.com/office/powerpoint/2012/main" xmlns="">
+      <p15:sldGuideLst xmlns:p15="http://schemas.microsoft.com/office/powerpoint/2012/main">
         <p15:guide id="1" pos="283">
           <p15:clr>
             <a:srgbClr val="FBAE40"/>
@@ -8200,8 +8200,8 @@
         </p:nvSpPr>
         <p:spPr>
           <a:xfrm>
-            <a:off x="976312" y="4178885"/>
-            <a:ext cx="5232400" cy="507831"/>
+            <a:off x="976312" y="4009608"/>
+            <a:ext cx="5232400" cy="677108"/>
           </a:xfrm>
         </p:spPr>
         <p:txBody>
@@ -8210,20 +8210,35 @@
           <a:p>
             <a:r>
               <a:rPr lang="pl-PL" dirty="0" smtClean="0"/>
-              <a:t>Marek Strejczek</a:t>
+              <a:t>Autor: Marek Strejczek</a:t>
+            </a:r>
+          </a:p>
+          <a:p>
+            <a:r>
+              <a:rPr lang="pl-PL" dirty="0" smtClean="0"/>
+              <a:t>Prowadzący: Mateusz Kołodziejski</a:t>
             </a:r>
             <a:endParaRPr lang="de-DE" dirty="0" smtClean="0"/>
           </a:p>
           <a:p>
             <a:r>
               <a:rPr lang="pl-PL" dirty="0" smtClean="0"/>
-              <a:t>Lato 2016</a:t>
-            </a:r>
-          </a:p>
-          <a:p>
-            <a:r>
-              <a:rPr lang="pl-PL" dirty="0" smtClean="0"/>
-              <a:t>Wersja 1.0</a:t>
+              <a:t>Lato </a:t>
+            </a:r>
+            <a:r>
+              <a:rPr lang="pl-PL" dirty="0" smtClean="0"/>
+              <a:t>2017</a:t>
+            </a:r>
+            <a:endParaRPr lang="pl-PL" dirty="0" smtClean="0"/>
+          </a:p>
+          <a:p>
+            <a:r>
+              <a:rPr lang="pl-PL" dirty="0" smtClean="0"/>
+              <a:t>Wersja </a:t>
+            </a:r>
+            <a:r>
+              <a:rPr lang="pl-PL" dirty="0" smtClean="0"/>
+              <a:t>1.1</a:t>
             </a:r>
             <a:endParaRPr lang="de-DE" dirty="0"/>
           </a:p>
@@ -8841,7 +8856,9 @@
           </a:xfrm>
         </p:spPr>
         <p:txBody>
-          <a:bodyPr/>
+          <a:bodyPr>
+            <a:normAutofit lnSpcReduction="10000"/>
+          </a:bodyPr>
           <a:lstStyle/>
           <a:p>
             <a:r>
@@ -8871,28 +8888,44 @@
           </a:p>
           <a:p>
             <a:r>
-              <a:rPr lang="pl-PL" dirty="0" err="1" smtClean="0">
+              <a:rPr lang="pl-PL" dirty="0" smtClean="0">
                 <a:solidFill>
-                  <a:srgbClr val="00B050"/>
+                  <a:srgbClr val="002060"/>
                 </a:solidFill>
               </a:rPr>
-              <a:t>gradlew</a:t>
-            </a:r>
+              <a:t>Pliki konfiguracyjne gradle:</a:t>
+            </a:r>
+          </a:p>
+          <a:p>
+            <a:pPr lvl="1"/>
+            <a:r>
+              <a:rPr lang="pl-PL" dirty="0" smtClean="0">
+                <a:solidFill>
+                  <a:srgbClr val="002060"/>
+                </a:solidFill>
+              </a:rPr>
+              <a:t>build.gradle</a:t>
+            </a:r>
+          </a:p>
+          <a:p>
+            <a:pPr lvl="1"/>
+            <a:r>
+              <a:rPr lang="pl-PL" dirty="0" smtClean="0">
+                <a:solidFill>
+                  <a:srgbClr val="002060"/>
+                </a:solidFill>
+              </a:rPr>
+              <a:t>settings.gradle</a:t>
+            </a:r>
+          </a:p>
+          <a:p>
             <a:r>
               <a:rPr lang="pl-PL" dirty="0" smtClean="0">
                 <a:solidFill>
                   <a:srgbClr val="00B050"/>
                 </a:solidFill>
               </a:rPr>
-              <a:t> run –</a:t>
-            </a:r>
-            <a:r>
-              <a:rPr lang="pl-PL" dirty="0" err="1" smtClean="0">
-                <a:solidFill>
-                  <a:srgbClr val="00B050"/>
-                </a:solidFill>
-              </a:rPr>
-              <a:t>Dexec.args</a:t>
+              <a:t>./</a:t>
             </a:r>
             <a:r>
               <a:rPr lang="pl-PL" dirty="0" smtClean="0">
@@ -8900,7 +8933,7 @@
                   <a:srgbClr val="00B050"/>
                 </a:solidFill>
               </a:rPr>
-              <a:t>=„2 -3 5”</a:t>
+              <a:t>gradlew run -Dexec.args="2 -3 5"</a:t>
             </a:r>
           </a:p>
           <a:p>
@@ -13358,15 +13391,7 @@
                   <a:srgbClr val="00B050"/>
                 </a:solidFill>
               </a:rPr>
-              <a:t>1d: Dodanie testów jednostkowych do </a:t>
-            </a:r>
-            <a:r>
-              <a:rPr lang="pl-PL" dirty="0" smtClean="0">
-                <a:solidFill>
-                  <a:srgbClr val="00B050"/>
-                </a:solidFill>
-              </a:rPr>
-              <a:t>aplikacji</a:t>
+              <a:t>1d: Dodanie testów jednostkowych do aplikacji</a:t>
             </a:r>
           </a:p>
           <a:p>
@@ -13960,7 +13985,6 @@
               <a:rPr lang="pl-PL" dirty="0" smtClean="0"/>
               <a:t> W SYSTEMIE PRODUKCYJNYM !!! (na naszych zajęciach też nie)</a:t>
             </a:r>
-            <a:endParaRPr lang="pl-PL" dirty="0" smtClean="0"/>
           </a:p>
           <a:p>
             <a:pPr lvl="1"/>
@@ -14318,7 +14342,6 @@
               <a:rPr lang="pl-PL" dirty="0" smtClean="0"/>
               <a:t>Po dodaniu brakującej zależności wynik powinien wyglądać mniej więcej tak:</a:t>
             </a:r>
-            <a:endParaRPr lang="pl-PL" dirty="0" smtClean="0"/>
           </a:p>
           <a:p>
             <a:endParaRPr lang="pl-PL" dirty="0"/>
@@ -14644,11 +14667,7 @@
             <a:pPr lvl="1"/>
             <a:r>
               <a:rPr lang="pl-PL" dirty="0" smtClean="0"/>
-              <a:t>(jak zwykle) Kod musi znaleźć się </a:t>
-            </a:r>
-            <a:r>
-              <a:rPr lang="pl-PL" smtClean="0"/>
-              <a:t>w GitHubie.</a:t>
+              <a:t>(jak zwykle) Kod musi znaleźć się w GitHubie.</a:t>
             </a:r>
             <a:endParaRPr lang="pl-PL" dirty="0"/>
           </a:p>
@@ -15873,7 +15892,6 @@
               <a:rPr lang="pl-PL" dirty="0" smtClean="0"/>
               <a:t>).</a:t>
             </a:r>
-            <a:endParaRPr lang="pl-PL" dirty="0" smtClean="0"/>
           </a:p>
           <a:p>
             <a:pPr lvl="1"/>
@@ -16025,11 +16043,7 @@
           <a:p>
             <a:r>
               <a:rPr lang="pl-PL" dirty="0" smtClean="0"/>
-              <a:t>ĆWICZENIE </a:t>
-            </a:r>
-            <a:r>
-              <a:rPr lang="pl-PL" dirty="0" smtClean="0"/>
-              <a:t>1E</a:t>
+              <a:t>ĆWICZENIE 1E</a:t>
             </a:r>
             <a:endParaRPr lang="de-DE" dirty="0"/>
           </a:p>
@@ -16078,21 +16092,8 @@
                   <a:schemeClr val="tx1"/>
                 </a:solidFill>
               </a:rPr>
-              <a:t>Ćwiczenie </a:t>
-            </a:r>
-            <a:r>
-              <a:rPr lang="pl-PL" sz="1600" dirty="0" smtClean="0">
-                <a:solidFill>
-                  <a:schemeClr val="tx1"/>
-                </a:solidFill>
-              </a:rPr>
-              <a:t>1E</a:t>
-            </a:r>
-            <a:endParaRPr lang="pl-PL" sz="1600" dirty="0" smtClean="0">
-              <a:solidFill>
-                <a:schemeClr val="tx1"/>
-              </a:solidFill>
-            </a:endParaRPr>
+              <a:t>Ćwiczenie 1E</a:t>
+            </a:r>
           </a:p>
           <a:p>
             <a:pPr lvl="1"/>
@@ -16209,11 +16210,7 @@
           <a:p>
             <a:r>
               <a:rPr lang="pl-PL" dirty="0" smtClean="0"/>
-              <a:t>ĆWICZENIE </a:t>
-            </a:r>
-            <a:r>
-              <a:rPr lang="pl-PL" dirty="0" smtClean="0"/>
-              <a:t>1E</a:t>
+              <a:t>ĆWICZENIE 1E</a:t>
             </a:r>
             <a:endParaRPr lang="de-DE" dirty="0"/>
           </a:p>
@@ -16356,11 +16353,6 @@
               </a:rPr>
               <a:t>Obiekt testowany</a:t>
             </a:r>
-            <a:endParaRPr lang="pl-PL" sz="1200" dirty="0" smtClean="0">
-              <a:solidFill>
-                <a:schemeClr val="tx1"/>
-              </a:solidFill>
-            </a:endParaRPr>
           </a:p>
         </p:txBody>
       </p:sp>
@@ -16409,11 +16401,6 @@
               </a:rPr>
               <a:t>Baza danych</a:t>
             </a:r>
-            <a:endParaRPr lang="pl-PL" sz="1200" dirty="0" smtClean="0">
-              <a:solidFill>
-                <a:schemeClr val="tx1"/>
-              </a:solidFill>
-            </a:endParaRPr>
           </a:p>
         </p:txBody>
       </p:sp>
@@ -16462,11 +16449,6 @@
               </a:rPr>
               <a:t>Złożony obiekt</a:t>
             </a:r>
-            <a:endParaRPr lang="pl-PL" sz="1200" dirty="0" smtClean="0">
-              <a:solidFill>
-                <a:schemeClr val="tx1"/>
-              </a:solidFill>
-            </a:endParaRPr>
           </a:p>
         </p:txBody>
       </p:sp>
@@ -16595,11 +16577,6 @@
               </a:rPr>
               <a:t>Obiekt testowany</a:t>
             </a:r>
-            <a:endParaRPr lang="pl-PL" sz="1200" dirty="0" smtClean="0">
-              <a:solidFill>
-                <a:schemeClr val="tx1"/>
-              </a:solidFill>
-            </a:endParaRPr>
           </a:p>
         </p:txBody>
       </p:sp>
@@ -16656,11 +16633,6 @@
               </a:rPr>
               <a:t> bazy danych</a:t>
             </a:r>
-            <a:endParaRPr lang="pl-PL" sz="1200" dirty="0" smtClean="0">
-              <a:solidFill>
-                <a:schemeClr val="tx1"/>
-              </a:solidFill>
-            </a:endParaRPr>
           </a:p>
         </p:txBody>
       </p:sp>
@@ -16717,11 +16689,6 @@
               </a:rPr>
               <a:t> złożonego obiektu</a:t>
             </a:r>
-            <a:endParaRPr lang="pl-PL" sz="1200" dirty="0" smtClean="0">
-              <a:solidFill>
-                <a:schemeClr val="tx1"/>
-              </a:solidFill>
-            </a:endParaRPr>
           </a:p>
         </p:txBody>
       </p:sp>
@@ -16936,11 +16903,7 @@
           <a:p>
             <a:r>
               <a:rPr lang="pl-PL" dirty="0" smtClean="0"/>
-              <a:t>ĆWICZENIE </a:t>
-            </a:r>
-            <a:r>
-              <a:rPr lang="pl-PL" dirty="0" smtClean="0"/>
-              <a:t>1E</a:t>
+              <a:t>ĆWICZENIE 1E</a:t>
             </a:r>
             <a:endParaRPr lang="de-DE" dirty="0"/>
           </a:p>
@@ -17155,11 +17118,7 @@
           <a:p>
             <a:r>
               <a:rPr lang="pl-PL" dirty="0" smtClean="0"/>
-              <a:t>ĆWICZENIE </a:t>
-            </a:r>
-            <a:r>
-              <a:rPr lang="pl-PL" dirty="0" smtClean="0"/>
-              <a:t>1E</a:t>
+              <a:t>ĆWICZENIE 1E</a:t>
             </a:r>
             <a:endParaRPr lang="de-DE" dirty="0"/>
           </a:p>
@@ -17224,11 +17183,7 @@
             <a:pPr lvl="1"/>
             <a:r>
               <a:rPr lang="pl-PL" dirty="0" smtClean="0"/>
-              <a:t>Ta komenda usuwa wcześniej wygenerowane artefakty (o ile istnieją), po czym kompiluje kod aplikacji i testów, uruchamia testy i buduje aplikację</a:t>
-            </a:r>
-            <a:r>
-              <a:rPr lang="pl-PL" dirty="0" smtClean="0"/>
-              <a:t>.</a:t>
+              <a:t>Ta komenda usuwa wcześniej wygenerowane artefakty (o ile istnieją), po czym kompiluje kod aplikacji i testów, uruchamia testy i buduje aplikację.</a:t>
             </a:r>
           </a:p>
           <a:p>
@@ -17400,11 +17355,7 @@
           <a:p>
             <a:r>
               <a:rPr lang="pl-PL" dirty="0" smtClean="0"/>
-              <a:t>ĆWICZENIE </a:t>
-            </a:r>
-            <a:r>
-              <a:rPr lang="pl-PL" dirty="0" smtClean="0"/>
-              <a:t>1E</a:t>
+              <a:t>ĆWICZENIE 1E</a:t>
             </a:r>
             <a:endParaRPr lang="de-DE" dirty="0"/>
           </a:p>
@@ -17914,11 +17865,6 @@
               </a:rPr>
               <a:t>)</a:t>
             </a:r>
-            <a:endParaRPr lang="pl-PL" sz="1200" dirty="0" smtClean="0">
-              <a:solidFill>
-                <a:schemeClr val="bg1"/>
-              </a:solidFill>
-            </a:endParaRPr>
           </a:p>
         </p:txBody>
       </p:sp>
@@ -17967,11 +17913,6 @@
               </a:rPr>
               <a:t>Maszyna wirtualna JVM</a:t>
             </a:r>
-            <a:endParaRPr lang="pl-PL" sz="1200" dirty="0" smtClean="0">
-              <a:solidFill>
-                <a:schemeClr val="bg1"/>
-              </a:solidFill>
-            </a:endParaRPr>
           </a:p>
         </p:txBody>
       </p:sp>
@@ -18149,11 +18090,6 @@
               </a:rPr>
               <a:t>System operacyjny + sprzęt</a:t>
             </a:r>
-            <a:endParaRPr lang="pl-PL" sz="1200" dirty="0" smtClean="0">
-              <a:solidFill>
-                <a:schemeClr val="bg1"/>
-              </a:solidFill>
-            </a:endParaRPr>
           </a:p>
         </p:txBody>
       </p:sp>
@@ -18226,7 +18162,6 @@
               <a:rPr lang="pl-PL" sz="1050" dirty="0" smtClean="0"/>
               <a:t>Literatura:</a:t>
             </a:r>
-            <a:endParaRPr lang="pl-PL" sz="1050" dirty="0" smtClean="0"/>
           </a:p>
           <a:p>
             <a:pPr marL="171450" indent="-171450">
@@ -18375,7 +18310,6 @@
               <a:rPr lang="pl-PL" sz="900" dirty="0" smtClean="0"/>
               <a:t> umieszcza się (razem z innymi zasobami jak pliki konfiguracyjne) w plikach .jar (Java Archive).</a:t>
             </a:r>
-            <a:endParaRPr lang="pl-PL" sz="900" dirty="0" smtClean="0"/>
           </a:p>
         </p:txBody>
       </p:sp>
@@ -18405,7 +18339,6 @@
               <a:rPr lang="pl-PL" sz="900" dirty="0" smtClean="0"/>
               <a:t>Na przykład Windows x64 na IA64 albo Linux na ARM</a:t>
             </a:r>
-            <a:endParaRPr lang="pl-PL" sz="900" dirty="0" smtClean="0"/>
           </a:p>
         </p:txBody>
       </p:sp>
@@ -18638,11 +18571,7 @@
             </a:r>
             <a:r>
               <a:rPr lang="pl-PL" dirty="0" smtClean="0"/>
-              <a:t>„bin” JDK do zmiennej środowiskowej </a:t>
-            </a:r>
-            <a:r>
-              <a:rPr lang="pl-PL" dirty="0" smtClean="0"/>
-              <a:t>PATH</a:t>
+              <a:t>„bin” JDK do zmiennej środowiskowej PATH</a:t>
             </a:r>
           </a:p>
           <a:p>
@@ -18667,7 +18596,6 @@
               <a:rPr lang="pl-PL" dirty="0" smtClean="0"/>
               <a:t>\)</a:t>
             </a:r>
-            <a:endParaRPr lang="pl-PL" dirty="0" smtClean="0"/>
           </a:p>
           <a:p>
             <a:endParaRPr lang="pl-PL" dirty="0"/>
@@ -19163,28 +19091,20 @@
           <a:p>
             <a:pPr lvl="1"/>
             <a:r>
-              <a:rPr lang="pl-PL" dirty="0" err="1">
-                <a:solidFill>
-                  <a:schemeClr val="accent3"/>
-                </a:solidFill>
-              </a:rPr>
-              <a:t>javac</a:t>
-            </a:r>
-            <a:r>
               <a:rPr lang="pl-PL" dirty="0">
                 <a:solidFill>
                   <a:schemeClr val="accent3"/>
                 </a:solidFill>
               </a:rPr>
-              <a:t> </a:t>
-            </a:r>
-            <a:r>
-              <a:rPr lang="pl-PL" dirty="0" err="1">
+              <a:t>javac </a:t>
+            </a:r>
+            <a:r>
+              <a:rPr lang="pl-PL" dirty="0" smtClean="0">
                 <a:solidFill>
                   <a:schemeClr val="accent3"/>
                 </a:solidFill>
               </a:rPr>
-              <a:t>wdsr</a:t>
+              <a:t>"wdsr\exercise1\conversions\*.*" </a:t>
             </a:r>
             <a:r>
               <a:rPr lang="pl-PL" dirty="0">
@@ -19192,23 +19112,7 @@
                   <a:schemeClr val="accent3"/>
                 </a:solidFill>
               </a:rPr>
-              <a:t>\exercise1\</a:t>
-            </a:r>
-            <a:r>
-              <a:rPr lang="pl-PL" dirty="0" err="1">
-                <a:solidFill>
-                  <a:schemeClr val="accent3"/>
-                </a:solidFill>
-              </a:rPr>
-              <a:t>conversions</a:t>
-            </a:r>
-            <a:r>
-              <a:rPr lang="pl-PL" dirty="0">
-                <a:solidFill>
-                  <a:schemeClr val="accent3"/>
-                </a:solidFill>
-              </a:rPr>
-              <a:t>\*.* -d </a:t>
+              <a:t>-d </a:t>
             </a:r>
             <a:r>
               <a:rPr lang="pl-PL" dirty="0" smtClean="0">
@@ -19811,7 +19715,9 @@
           </a:xfrm>
         </p:spPr>
         <p:txBody>
-          <a:bodyPr/>
+          <a:bodyPr>
+            <a:normAutofit lnSpcReduction="10000"/>
+          </a:bodyPr>
           <a:lstStyle/>
           <a:p>
             <a:r>
@@ -19906,7 +19812,6 @@
             </a:r>
           </a:p>
           <a:p>
-            <a:pPr lvl="2"/>
             <a:r>
               <a:rPr lang="pl-PL" dirty="0" smtClean="0"/>
               <a:t>Ta operacja się nie uda – kompilator nie może znaleźć zależności (biblioteki </a:t>
@@ -19921,7 +19826,6 @@
             </a:r>
           </a:p>
           <a:p>
-            <a:pPr lvl="1"/>
             <a:r>
               <a:rPr lang="pl-PL" dirty="0" smtClean="0"/>
               <a:t>Ściągamy bibliotekę commons-lang3 i umieszczamy ją w podkatalogu „</a:t>
@@ -19936,32 +19840,56 @@
             </a:r>
           </a:p>
           <a:p>
-            <a:pPr lvl="2"/>
-            <a:r>
-              <a:rPr lang="pl-PL" sz="900" dirty="0" err="1" smtClean="0">
+            <a:pPr lvl="1"/>
+            <a:r>
+              <a:rPr lang="pl-PL" dirty="0">
                 <a:solidFill>
                   <a:schemeClr val="accent3"/>
                 </a:solidFill>
               </a:rPr>
-              <a:t>curl</a:t>
-            </a:r>
-            <a:r>
-              <a:rPr lang="pl-PL" sz="900" dirty="0" smtClean="0">
+              <a:t>mkdir lib</a:t>
+            </a:r>
+          </a:p>
+          <a:p>
+            <a:pPr lvl="1"/>
+            <a:r>
+              <a:rPr lang="pl-PL" dirty="0">
                 <a:solidFill>
                   <a:schemeClr val="accent3"/>
                 </a:solidFill>
               </a:rPr>
-              <a:t> </a:t>
-            </a:r>
-            <a:r>
-              <a:rPr lang="pl-PL" sz="900" dirty="0">
+              <a:t>cd lib</a:t>
+            </a:r>
+          </a:p>
+          <a:p>
+            <a:pPr lvl="1"/>
+            <a:r>
+              <a:rPr lang="pl-PL" dirty="0">
                 <a:solidFill>
                   <a:schemeClr val="accent3"/>
                 </a:solidFill>
               </a:rPr>
-              <a:t>-O http://central.maven.org/maven2/org/apache/commons/commons-lang3/3.4/commons-lang3-3.4.jar</a:t>
-            </a:r>
-            <a:endParaRPr lang="pl-PL" sz="900" dirty="0" smtClean="0">
+              <a:t>curl -O </a:t>
+            </a:r>
+            <a:r>
+              <a:rPr lang="pl-PL" dirty="0">
+                <a:solidFill>
+                  <a:schemeClr val="accent3"/>
+                </a:solidFill>
+                <a:hlinkClick r:id="rId3"/>
+              </a:rPr>
+              <a:t>http://</a:t>
+            </a:r>
+            <a:r>
+              <a:rPr lang="pl-PL" dirty="0" smtClean="0">
+                <a:solidFill>
+                  <a:schemeClr val="accent3"/>
+                </a:solidFill>
+                <a:hlinkClick r:id="rId3"/>
+              </a:rPr>
+              <a:t>central.maven.org/maven2/org/apache/commons/commons-lang3/3.4/commons-lang3-3.4.jar</a:t>
+            </a:r>
+            <a:endParaRPr lang="pl-PL" dirty="0" smtClean="0">
               <a:solidFill>
                 <a:schemeClr val="accent3"/>
               </a:solidFill>
@@ -19975,15 +19903,38 @@
                   <a:schemeClr val="accent3"/>
                 </a:solidFill>
               </a:rPr>
-              <a:t>javac -classpath ..\conversions\bin;lib\commons-lang3-3.4.jar;. </a:t>
-            </a:r>
-            <a:r>
-              <a:rPr lang="pl-PL" dirty="0" err="1">
+              <a:t>cd ..</a:t>
+            </a:r>
+            <a:endParaRPr lang="pl-PL" dirty="0">
+              <a:solidFill>
+                <a:schemeClr val="accent3"/>
+              </a:solidFill>
+            </a:endParaRPr>
+          </a:p>
+          <a:p>
+            <a:r>
+              <a:rPr lang="pl-PL" dirty="0"/>
+              <a:t>Kompilacja ze wskazaniem zależności (classpath</a:t>
+            </a:r>
+            <a:r>
+              <a:rPr lang="pl-PL" dirty="0" smtClean="0"/>
+              <a:t>)</a:t>
+            </a:r>
+            <a:endParaRPr lang="pl-PL" dirty="0" smtClean="0">
+              <a:solidFill>
+                <a:schemeClr val="accent3"/>
+              </a:solidFill>
+            </a:endParaRPr>
+          </a:p>
+          <a:p>
+            <a:pPr lvl="1"/>
+            <a:r>
+              <a:rPr lang="pl-PL" dirty="0" smtClean="0">
                 <a:solidFill>
                   <a:schemeClr val="accent3"/>
                 </a:solidFill>
               </a:rPr>
-              <a:t>wdsr</a:t>
+              <a:t>javac </a:t>
             </a:r>
             <a:r>
               <a:rPr lang="pl-PL" dirty="0">
@@ -19991,15 +19942,15 @@
                   <a:schemeClr val="accent3"/>
                 </a:solidFill>
               </a:rPr>
-              <a:t>\exercise1\*.</a:t>
-            </a:r>
-            <a:r>
-              <a:rPr lang="pl-PL" dirty="0" err="1">
+              <a:t>-classpath "..\</a:t>
+            </a:r>
+            <a:r>
+              <a:rPr lang="pl-PL" dirty="0" smtClean="0">
                 <a:solidFill>
                   <a:schemeClr val="accent3"/>
                 </a:solidFill>
               </a:rPr>
-              <a:t>java</a:t>
+              <a:t>conversions\bin;lib\commons-lang3-3.4.jar</a:t>
             </a:r>
             <a:r>
               <a:rPr lang="pl-PL" dirty="0">
@@ -20007,7 +19958,7 @@
                   <a:schemeClr val="accent3"/>
                 </a:solidFill>
               </a:rPr>
-              <a:t> -d </a:t>
+              <a:t>;." "wdsr\exercise1\*.java" -d </a:t>
             </a:r>
             <a:r>
               <a:rPr lang="pl-PL" dirty="0" smtClean="0">
@@ -20019,97 +19970,41 @@
             </a:r>
           </a:p>
           <a:p>
-            <a:pPr lvl="2"/>
-            <a:r>
-              <a:rPr lang="pl-PL" dirty="0" smtClean="0"/>
-              <a:t>Kompilacja ze wskazaniem zależności (classpath)</a:t>
-            </a:r>
+            <a:r>
+              <a:rPr lang="pl-PL" dirty="0"/>
+              <a:t>Uruchomienie aplikacji z argumentami 2, -3 i -5</a:t>
+            </a:r>
+            <a:r>
+              <a:rPr lang="pl-PL" dirty="0" smtClean="0"/>
+              <a:t>.</a:t>
+            </a:r>
+            <a:endParaRPr lang="pl-PL" dirty="0" smtClean="0">
+              <a:solidFill>
+                <a:schemeClr val="accent3"/>
+              </a:solidFill>
+            </a:endParaRPr>
           </a:p>
           <a:p>
             <a:pPr lvl="1"/>
             <a:r>
-              <a:rPr lang="pl-PL" dirty="0" smtClean="0">
+              <a:rPr lang="pl-PL" dirty="0">
                 <a:solidFill>
                   <a:schemeClr val="accent3"/>
                 </a:solidFill>
               </a:rPr>
-              <a:t>jar </a:t>
-            </a:r>
-            <a:r>
-              <a:rPr lang="pl-PL" dirty="0" err="1" smtClean="0">
+              <a:t>jar cvf calculator-1.0.jar -C bin .</a:t>
+            </a:r>
+          </a:p>
+          <a:p>
+            <a:pPr lvl="1"/>
+            <a:r>
+              <a:rPr lang="pl-PL" dirty="0">
                 <a:solidFill>
                   <a:schemeClr val="accent3"/>
                 </a:solidFill>
               </a:rPr>
-              <a:t>cvf</a:t>
-            </a:r>
-            <a:r>
-              <a:rPr lang="pl-PL" dirty="0" smtClean="0">
-                <a:solidFill>
-                  <a:schemeClr val="accent3"/>
-                </a:solidFill>
-              </a:rPr>
-              <a:t> calculator-1.0.jar -C bin .</a:t>
-            </a:r>
-          </a:p>
-          <a:p>
-            <a:pPr lvl="1"/>
-            <a:r>
-              <a:rPr lang="pl-PL" sz="1050" dirty="0" err="1" smtClean="0">
-                <a:solidFill>
-                  <a:schemeClr val="accent3"/>
-                </a:solidFill>
-              </a:rPr>
-              <a:t>java</a:t>
-            </a:r>
-            <a:r>
-              <a:rPr lang="pl-PL" sz="1050" dirty="0" smtClean="0">
-                <a:solidFill>
-                  <a:schemeClr val="accent3"/>
-                </a:solidFill>
-              </a:rPr>
-              <a:t> -</a:t>
-            </a:r>
-            <a:r>
-              <a:rPr lang="pl-PL" sz="1050" dirty="0" err="1" smtClean="0">
-                <a:solidFill>
-                  <a:schemeClr val="accent3"/>
-                </a:solidFill>
-              </a:rPr>
-              <a:t>cp</a:t>
-            </a:r>
-            <a:r>
-              <a:rPr lang="pl-PL" sz="1050" dirty="0" smtClean="0">
-                <a:solidFill>
-                  <a:schemeClr val="accent3"/>
-                </a:solidFill>
-              </a:rPr>
-              <a:t> calculator-1.0.jar;lib\commons-lang3-3.4.jar;..\</a:t>
-            </a:r>
-            <a:r>
-              <a:rPr lang="pl-PL" sz="1050" dirty="0" err="1" smtClean="0">
-                <a:solidFill>
-                  <a:schemeClr val="accent3"/>
-                </a:solidFill>
-              </a:rPr>
-              <a:t>conversions</a:t>
-            </a:r>
-            <a:r>
-              <a:rPr lang="pl-PL" sz="1050" dirty="0" smtClean="0">
-                <a:solidFill>
-                  <a:schemeClr val="accent3"/>
-                </a:solidFill>
-              </a:rPr>
-              <a:t>\conversions-1.0.jar wdsr.exercise1.Main 2 -3 -5</a:t>
-            </a:r>
-          </a:p>
-          <a:p>
-            <a:pPr lvl="2"/>
-            <a:r>
-              <a:rPr lang="pl-PL" sz="1050" dirty="0" smtClean="0"/>
-              <a:t>Uruchomienie aplikacji z argumentami 2, -3 i -5.</a:t>
-            </a:r>
-            <a:endParaRPr lang="pl-PL" sz="1050" dirty="0"/>
+              <a:t>java -cp "calculator-1.0.jar;lib\commons-lang3-3.4.jar;..\conversions\conversions-1.0.jar" wdsr.exercise1.Main 2 -3 -5</a:t>
+            </a:r>
           </a:p>
         </p:txBody>
       </p:sp>
@@ -20425,7 +20320,7 @@
   <a:extraClrSchemeLst/>
   <a:extLst>
     <a:ext uri="{05A4C25C-085E-4340-85A3-A5531E510DB2}">
-      <thm15:themeFamily xmlns:thm15="http://schemas.microsoft.com/office/thememl/2012/main" xmlns="" name="GFT_Chartpool_2015.pptx" id="{A28C9458-9558-44C8-89F4-D7A2CBC04405}" vid="{0F156D25-70FA-498B-891B-4FDE46BF1046}"/>
+      <thm15:themeFamily xmlns:thm15="http://schemas.microsoft.com/office/thememl/2012/main" name="GFT_Chartpool_2015.pptx" id="{A28C9458-9558-44C8-89F4-D7A2CBC04405}" vid="{0F156D25-70FA-498B-891B-4FDE46BF1046}"/>
     </a:ext>
   </a:extLst>
 </a:theme>
@@ -21072,15 +20967,6 @@
 </file>
 
 <file path=customXml/item1.xml><?xml version="1.0" encoding="utf-8"?>
-<?mso-contentType ?>
-<FormTemplates xmlns="http://schemas.microsoft.com/sharepoint/v3/contenttype/forms">
-  <Display>DocumentLibraryForm</Display>
-  <Edit>DocumentLibraryForm</Edit>
-  <New>DocumentLibraryForm</New>
-</FormTemplates>
-</file>
-
-<file path=customXml/item2.xml><?xml version="1.0" encoding="utf-8"?>
 <ct:contentTypeSchema xmlns:ct="http://schemas.microsoft.com/office/2006/metadata/contentType" xmlns:ma="http://schemas.microsoft.com/office/2006/metadata/properties/metaAttributes" ct:_="" ma:_="" ma:contentTypeName="Document" ma:contentTypeID="0x010100793B9935CA02AD4F90F0A0FD564FDD82" ma:contentTypeVersion="17" ma:contentTypeDescription="Create a new document." ma:contentTypeScope="" ma:versionID="6168266ad0b2c1ccdc9d2ae0268a5eb6">
   <xsd:schema xmlns:xsd="http://www.w3.org/2001/XMLSchema" xmlns:xs="http://www.w3.org/2001/XMLSchema" xmlns:p="http://schemas.microsoft.com/office/2006/metadata/properties" xmlns:ns2="e44e039f-c551-4112-981c-456f1b630ef1" xmlns:ns3="727178e8-9586-4f49-8e7b-77af9c2fb085" targetNamespace="http://schemas.microsoft.com/office/2006/metadata/properties" ma:root="true" ma:fieldsID="b9b29daf9bb73cd90369de1b0e977594" ns2:_="" ns3:_="">
     <xsd:import namespace="e44e039f-c551-4112-981c-456f1b630ef1"/>
@@ -21577,7 +21463,51 @@
 </ct:contentTypeSchema>
 </file>
 
+<file path=customXml/item2.xml><?xml version="1.0" encoding="utf-8"?>
+<?mso-contentType ?>
+<FormTemplates xmlns="http://schemas.microsoft.com/sharepoint/v3/contenttype/forms">
+  <Display>DocumentLibraryForm</Display>
+  <Edit>DocumentLibraryForm</Edit>
+  <New>DocumentLibraryForm</New>
+</FormTemplates>
+</file>
+
 <file path=customXml/item3.xml><?xml version="1.0" encoding="utf-8"?>
+<p:properties xmlns:p="http://schemas.microsoft.com/office/2006/metadata/properties" xmlns:xsi="http://www.w3.org/2001/XMLSchema-instance" xmlns:pc="http://schemas.microsoft.com/office/infopath/2007/PartnerControls">
+  <documentManagement>
+    <_dlc_DocId xmlns="727178e8-9586-4f49-8e7b-77af9c2fb085">CVD5QAC74SYH-2-13943</_dlc_DocId>
+    <_dlc_DocIdUrl xmlns="727178e8-9586-4f49-8e7b-77af9c2fb085">
+      <Url>https://share.gft.com/sites/Corporate-Marketing/_layouts/DocIdRedir.aspx?ID=CVD5QAC74SYH-2-13943</Url>
+      <Description>CVD5QAC74SYH-2-13943</Description>
+    </_dlc_DocIdUrl>
+    <Functional_x0020_Area xmlns="e44e039f-c551-4112-981c-456f1b630ef1">Functional Area 1</Functional_x0020_Area>
+    <Reference_x0020_Title xmlns="e44e039f-c551-4112-981c-456f1b630ef1" xsi:nil="true"/>
+    <Area xmlns="e44e039f-c551-4112-981c-456f1b630ef1">Area 1</Area>
+    <Project_x0020_size_x0020__x0028_resources_x0029_ xmlns="e44e039f-c551-4112-981c-456f1b630ef1" xsi:nil="true"/>
+    <Comments xmlns="e44e039f-c551-4112-981c-456f1b630ef1" xsi:nil="true"/>
+    <Business_x0020_Sector xmlns="e44e039f-c551-4112-981c-456f1b630ef1">Banking</Business_x0020_Sector>
+    <Client_x0020_Category xmlns="e44e039f-c551-4112-981c-456f1b630ef1">Central</Client_x0020_Category>
+    <Methods_x0020_and_x0020_standards xmlns="e44e039f-c551-4112-981c-456f1b630ef1" xsi:nil="true"/>
+    <Responsible xmlns="e44e039f-c551-4112-981c-456f1b630ef1">Marek Strejczek</Responsible>
+    <Client_x0020_Name xmlns="e44e039f-c551-4112-981c-456f1b630ef1" xsi:nil="true"/>
+    <Client_x0020_approval xmlns="e44e039f-c551-4112-981c-456f1b630ef1">No</Client_x0020_approval>
+    <Plattform_x0020__x0026__x0020_tools xmlns="e44e039f-c551-4112-981c-456f1b630ef1" xsi:nil="true"/>
+    <Project_x0020_ID xmlns="e44e039f-c551-4112-981c-456f1b630ef1" xsi:nil="true"/>
+    <Description0 xmlns="e44e039f-c551-4112-981c-456f1b630ef1" xsi:nil="true"/>
+    <Author_x0020__x002f__x0020_Contact xmlns="e44e039f-c551-4112-981c-456f1b630ef1">
+      <UserInfo>
+        <DisplayName/>
+        <AccountId xsi:nil="true"/>
+        <AccountType/>
+      </UserInfo>
+    </Author_x0020__x002f__x0020_Contact>
+    <Client_x0020_Country xmlns="e44e039f-c551-4112-981c-456f1b630ef1">Germany</Client_x0020_Country>
+    <Year xmlns="e44e039f-c551-4112-981c-456f1b630ef1" xsi:nil="true"/>
+  </documentManagement>
+</p:properties>
+</file>
+
+<file path=customXml/item4.xml><?xml version="1.0" encoding="utf-8"?>
 <?mso-contentType ?>
 <spe:Receivers xmlns:spe="http://schemas.microsoft.com/sharepoint/events">
   <Receiver>
@@ -21623,50 +21553,7 @@
 </spe:Receivers>
 </file>
 
-<file path=customXml/item4.xml><?xml version="1.0" encoding="utf-8"?>
-<p:properties xmlns:p="http://schemas.microsoft.com/office/2006/metadata/properties" xmlns:xsi="http://www.w3.org/2001/XMLSchema-instance" xmlns:pc="http://schemas.microsoft.com/office/infopath/2007/PartnerControls">
-  <documentManagement>
-    <_dlc_DocId xmlns="727178e8-9586-4f49-8e7b-77af9c2fb085">CVD5QAC74SYH-2-13943</_dlc_DocId>
-    <_dlc_DocIdUrl xmlns="727178e8-9586-4f49-8e7b-77af9c2fb085">
-      <Url>https://share.gft.com/sites/Corporate-Marketing/_layouts/DocIdRedir.aspx?ID=CVD5QAC74SYH-2-13943</Url>
-      <Description>CVD5QAC74SYH-2-13943</Description>
-    </_dlc_DocIdUrl>
-    <Functional_x0020_Area xmlns="e44e039f-c551-4112-981c-456f1b630ef1">Functional Area 1</Functional_x0020_Area>
-    <Reference_x0020_Title xmlns="e44e039f-c551-4112-981c-456f1b630ef1" xsi:nil="true"/>
-    <Area xmlns="e44e039f-c551-4112-981c-456f1b630ef1">Area 1</Area>
-    <Project_x0020_size_x0020__x0028_resources_x0029_ xmlns="e44e039f-c551-4112-981c-456f1b630ef1" xsi:nil="true"/>
-    <Comments xmlns="e44e039f-c551-4112-981c-456f1b630ef1" xsi:nil="true"/>
-    <Business_x0020_Sector xmlns="e44e039f-c551-4112-981c-456f1b630ef1">Banking</Business_x0020_Sector>
-    <Client_x0020_Category xmlns="e44e039f-c551-4112-981c-456f1b630ef1">Central</Client_x0020_Category>
-    <Methods_x0020_and_x0020_standards xmlns="e44e039f-c551-4112-981c-456f1b630ef1" xsi:nil="true"/>
-    <Responsible xmlns="e44e039f-c551-4112-981c-456f1b630ef1">Marek Strejczek</Responsible>
-    <Client_x0020_Name xmlns="e44e039f-c551-4112-981c-456f1b630ef1" xsi:nil="true"/>
-    <Client_x0020_approval xmlns="e44e039f-c551-4112-981c-456f1b630ef1">No</Client_x0020_approval>
-    <Plattform_x0020__x0026__x0020_tools xmlns="e44e039f-c551-4112-981c-456f1b630ef1" xsi:nil="true"/>
-    <Project_x0020_ID xmlns="e44e039f-c551-4112-981c-456f1b630ef1" xsi:nil="true"/>
-    <Description0 xmlns="e44e039f-c551-4112-981c-456f1b630ef1" xsi:nil="true"/>
-    <Author_x0020__x002f__x0020_Contact xmlns="e44e039f-c551-4112-981c-456f1b630ef1">
-      <UserInfo>
-        <DisplayName/>
-        <AccountId xsi:nil="true"/>
-        <AccountType/>
-      </UserInfo>
-    </Author_x0020__x002f__x0020_Contact>
-    <Client_x0020_Country xmlns="e44e039f-c551-4112-981c-456f1b630ef1">Germany</Client_x0020_Country>
-    <Year xmlns="e44e039f-c551-4112-981c-456f1b630ef1" xsi:nil="true"/>
-  </documentManagement>
-</p:properties>
-</file>
-
 <file path=customXml/itemProps1.xml><?xml version="1.0" encoding="utf-8"?>
-<ds:datastoreItem xmlns:ds="http://schemas.openxmlformats.org/officeDocument/2006/customXml" ds:itemID="{9217953E-6BB7-40C6-9A84-608D0A8D65EC}">
-  <ds:schemaRefs>
-    <ds:schemaRef ds:uri="http://schemas.microsoft.com/sharepoint/v3/contenttype/forms"/>
-  </ds:schemaRefs>
-</ds:datastoreItem>
-</file>
-
-<file path=customXml/itemProps2.xml><?xml version="1.0" encoding="utf-8"?>
 <ds:datastoreItem xmlns:ds="http://schemas.openxmlformats.org/officeDocument/2006/customXml" ds:itemID="{54CA1130-EAC1-4116-82E4-DF5A51FE3AEA}">
   <ds:schemaRefs>
     <ds:schemaRef ds:uri="http://schemas.microsoft.com/office/2006/metadata/contentType"/>
@@ -21685,15 +21572,15 @@
 </ds:datastoreItem>
 </file>
 
-<file path=customXml/itemProps3.xml><?xml version="1.0" encoding="utf-8"?>
-<ds:datastoreItem xmlns:ds="http://schemas.openxmlformats.org/officeDocument/2006/customXml" ds:itemID="{A6F3EA8F-EBA0-438A-80BD-6A96E2E10054}">
+<file path=customXml/itemProps2.xml><?xml version="1.0" encoding="utf-8"?>
+<ds:datastoreItem xmlns:ds="http://schemas.openxmlformats.org/officeDocument/2006/customXml" ds:itemID="{9217953E-6BB7-40C6-9A84-608D0A8D65EC}">
   <ds:schemaRefs>
-    <ds:schemaRef ds:uri="http://schemas.microsoft.com/sharepoint/events"/>
+    <ds:schemaRef ds:uri="http://schemas.microsoft.com/sharepoint/v3/contenttype/forms"/>
   </ds:schemaRefs>
 </ds:datastoreItem>
 </file>
 
-<file path=customXml/itemProps4.xml><?xml version="1.0" encoding="utf-8"?>
+<file path=customXml/itemProps3.xml><?xml version="1.0" encoding="utf-8"?>
 <ds:datastoreItem xmlns:ds="http://schemas.openxmlformats.org/officeDocument/2006/customXml" ds:itemID="{7445AAF4-B73F-4E3A-B9D2-4DDAE0F1BE8A}">
   <ds:schemaRefs>
     <ds:schemaRef ds:uri="http://purl.org/dc/dcmitype/"/>
@@ -21708,4 +21595,12 @@
     <ds:schemaRef ds:uri="http://www.w3.org/XML/1998/namespace"/>
   </ds:schemaRefs>
 </ds:datastoreItem>
+</file>
+
+<file path=customXml/itemProps4.xml><?xml version="1.0" encoding="utf-8"?>
+<ds:datastoreItem xmlns:ds="http://schemas.openxmlformats.org/officeDocument/2006/customXml" ds:itemID="{A6F3EA8F-EBA0-438A-80BD-6A96E2E10054}">
+  <ds:schemaRefs>
+    <ds:schemaRef ds:uri="http://schemas.microsoft.com/sharepoint/events"/>
+  </ds:schemaRefs>
+</ds:datastoreItem>
 </file>
</xml_diff>